<commit_message>
DCWL-1159 Updated XML Samples.
</commit_message>
<xml_diff>
--- a/public/api/conf/1.0/examples/annotated_XML_samples/Annotated_XML_Sample_Guidance_v1.3.pptx
+++ b/public/api/conf/1.0/examples/annotated_XML_samples/Annotated_XML_Sample_Guidance_v1.3.pptx
@@ -12397,10 +12397,10 @@
 </file>
 
 <file path=customXml/item2.xml><?xml version="1.0" encoding="utf-8"?>
-<ct:contentTypeSchema xmlns:ct="http://schemas.microsoft.com/office/2006/metadata/contentType" xmlns:ma="http://schemas.microsoft.com/office/2006/metadata/properties/metaAttributes" ct:_="" ma:_="" ma:contentTypeName="Document" ma:contentTypeID="0x010100E62A33F58702334EBF7311526B3DE3F0" ma:contentTypeVersion="15" ma:contentTypeDescription="Create a new document." ma:contentTypeScope="" ma:versionID="977969c0047b5e5be8638840a0ae1307">
-  <xsd:schema xmlns:xsd="http://www.w3.org/2001/XMLSchema" xmlns:xs="http://www.w3.org/2001/XMLSchema" xmlns:p="http://schemas.microsoft.com/office/2006/metadata/properties" xmlns:ns2="25558cfc-09cb-4f21-a339-24113151f02d" xmlns:ns3="67e6609d-4da6-43f2-b73c-9b749e56ecda" targetNamespace="http://schemas.microsoft.com/office/2006/metadata/properties" ma:root="true" ma:fieldsID="6efdbf2bade035783d617b88be4656c9" ns2:_="" ns3:_="">
-    <xsd:import namespace="25558cfc-09cb-4f21-a339-24113151f02d"/>
-    <xsd:import namespace="67e6609d-4da6-43f2-b73c-9b749e56ecda"/>
+<ct:contentTypeSchema xmlns:ct="http://schemas.microsoft.com/office/2006/metadata/contentType" xmlns:ma="http://schemas.microsoft.com/office/2006/metadata/properties/metaAttributes" ct:_="" ma:_="" ma:contentTypeName="Document" ma:contentTypeID="0x010100DB1CE12E84A3F5469F78394738FAA291" ma:contentTypeVersion="14" ma:contentTypeDescription="Create a new document." ma:contentTypeScope="" ma:versionID="c9571a1acdaddfe0a15ad6b04794a1f8">
+  <xsd:schema xmlns:xsd="http://www.w3.org/2001/XMLSchema" xmlns:xs="http://www.w3.org/2001/XMLSchema" xmlns:p="http://schemas.microsoft.com/office/2006/metadata/properties" xmlns:ns2="9f84fe44-06c1-4235-861e-8559e31132d3" xmlns:ns3="b801df0b-86be-446d-a251-5641b9beabd9" targetNamespace="http://schemas.microsoft.com/office/2006/metadata/properties" ma:root="true" ma:fieldsID="3695f29a245d141c2238055f86b20f5f" ns2:_="" ns3:_="">
+    <xsd:import namespace="9f84fe44-06c1-4235-861e-8559e31132d3"/>
+    <xsd:import namespace="b801df0b-86be-446d-a251-5641b9beabd9"/>
     <xsd:element name="properties">
       <xsd:complexType>
         <xsd:sequence>
@@ -12413,14 +12413,13 @@
                 <xsd:element ref="ns2:MediaServiceKeyPoints" minOccurs="0"/>
                 <xsd:element ref="ns3:SharedWithUsers" minOccurs="0"/>
                 <xsd:element ref="ns3:SharedWithDetails" minOccurs="0"/>
-                <xsd:element ref="ns2:MediaServiceAutoTags" minOccurs="0"/>
+                <xsd:element ref="ns2:lcf76f155ced4ddcb4097134ff3c332f" minOccurs="0"/>
+                <xsd:element ref="ns3:TaxCatchAll" minOccurs="0"/>
                 <xsd:element ref="ns2:MediaServiceOCR" minOccurs="0"/>
                 <xsd:element ref="ns2:MediaServiceGenerationTime" minOccurs="0"/>
                 <xsd:element ref="ns2:MediaServiceEventHashCode" minOccurs="0"/>
                 <xsd:element ref="ns2:MediaServiceDateTaken" minOccurs="0"/>
                 <xsd:element ref="ns2:MediaLengthInSeconds" minOccurs="0"/>
-                <xsd:element ref="ns2:lcf76f155ced4ddcb4097134ff3c332f" minOccurs="0"/>
-                <xsd:element ref="ns3:TaxCatchAll" minOccurs="0"/>
               </xsd:all>
             </xsd:complexType>
           </xsd:element>
@@ -12428,7 +12427,7 @@
       </xsd:complexType>
     </xsd:element>
   </xsd:schema>
-  <xsd:schema xmlns:xsd="http://www.w3.org/2001/XMLSchema" xmlns:xs="http://www.w3.org/2001/XMLSchema" xmlns:dms="http://schemas.microsoft.com/office/2006/documentManagement/types" xmlns:pc="http://schemas.microsoft.com/office/infopath/2007/PartnerControls" targetNamespace="25558cfc-09cb-4f21-a339-24113151f02d" elementFormDefault="qualified">
+  <xsd:schema xmlns:xsd="http://www.w3.org/2001/XMLSchema" xmlns:xs="http://www.w3.org/2001/XMLSchema" xmlns:dms="http://schemas.microsoft.com/office/2006/documentManagement/types" xmlns:pc="http://schemas.microsoft.com/office/infopath/2007/PartnerControls" targetNamespace="9f84fe44-06c1-4235-861e-8559e31132d3" elementFormDefault="qualified">
     <xsd:import namespace="http://schemas.microsoft.com/office/2006/documentManagement/types"/>
     <xsd:import namespace="http://schemas.microsoft.com/office/infopath/2007/PartnerControls"/>
     <xsd:element name="MediaServiceMetadata" ma:index="8" nillable="true" ma:displayName="MediaServiceMetadata" ma:hidden="true" ma:internalName="MediaServiceMetadata" ma:readOnly="true">
@@ -12453,47 +12452,42 @@
         </xsd:restriction>
       </xsd:simpleType>
     </xsd:element>
-    <xsd:element name="MediaServiceAutoTags" ma:index="14" nillable="true" ma:displayName="Tags" ma:internalName="MediaServiceAutoTags" ma:readOnly="true">
-      <xsd:simpleType>
-        <xsd:restriction base="dms:Text"/>
-      </xsd:simpleType>
+    <xsd:element name="lcf76f155ced4ddcb4097134ff3c332f" ma:index="15" nillable="true" ma:taxonomy="true" ma:internalName="lcf76f155ced4ddcb4097134ff3c332f" ma:taxonomyFieldName="MediaServiceImageTags" ma:displayName="Image Tags" ma:readOnly="false" ma:fieldId="{5cf76f15-5ced-4ddc-b409-7134ff3c332f}" ma:taxonomyMulti="true" ma:sspId="a3ebb39f-d69b-4575-80f5-9912993956e5" ma:termSetId="09814cd3-568e-fe90-9814-8d621ff8fb84" ma:anchorId="fba54fb3-c3e1-fe81-a776-ca4b69148c4d" ma:open="true" ma:isKeyword="false">
+      <xsd:complexType>
+        <xsd:sequence>
+          <xsd:element ref="pc:Terms" minOccurs="0" maxOccurs="1"/>
+        </xsd:sequence>
+      </xsd:complexType>
     </xsd:element>
-    <xsd:element name="MediaServiceOCR" ma:index="15" nillable="true" ma:displayName="Extracted Text" ma:internalName="MediaServiceOCR" ma:readOnly="true">
+    <xsd:element name="MediaServiceOCR" ma:index="17" nillable="true" ma:displayName="Extracted Text" ma:internalName="MediaServiceOCR" ma:readOnly="true">
       <xsd:simpleType>
         <xsd:restriction base="dms:Note">
           <xsd:maxLength value="255"/>
         </xsd:restriction>
       </xsd:simpleType>
     </xsd:element>
-    <xsd:element name="MediaServiceGenerationTime" ma:index="16" nillable="true" ma:displayName="MediaServiceGenerationTime" ma:hidden="true" ma:internalName="MediaServiceGenerationTime" ma:readOnly="true">
+    <xsd:element name="MediaServiceGenerationTime" ma:index="18" nillable="true" ma:displayName="MediaServiceGenerationTime" ma:hidden="true" ma:internalName="MediaServiceGenerationTime" ma:readOnly="true">
       <xsd:simpleType>
         <xsd:restriction base="dms:Text"/>
       </xsd:simpleType>
     </xsd:element>
-    <xsd:element name="MediaServiceEventHashCode" ma:index="17" nillable="true" ma:displayName="MediaServiceEventHashCode" ma:hidden="true" ma:internalName="MediaServiceEventHashCode" ma:readOnly="true">
+    <xsd:element name="MediaServiceEventHashCode" ma:index="19" nillable="true" ma:displayName="MediaServiceEventHashCode" ma:hidden="true" ma:internalName="MediaServiceEventHashCode" ma:readOnly="true">
       <xsd:simpleType>
         <xsd:restriction base="dms:Text"/>
       </xsd:simpleType>
     </xsd:element>
-    <xsd:element name="MediaServiceDateTaken" ma:index="18" nillable="true" ma:displayName="MediaServiceDateTaken" ma:hidden="true" ma:internalName="MediaServiceDateTaken" ma:readOnly="true">
+    <xsd:element name="MediaServiceDateTaken" ma:index="20" nillable="true" ma:displayName="MediaServiceDateTaken" ma:hidden="true" ma:indexed="true" ma:internalName="MediaServiceDateTaken" ma:readOnly="true">
       <xsd:simpleType>
         <xsd:restriction base="dms:Text"/>
       </xsd:simpleType>
     </xsd:element>
-    <xsd:element name="MediaLengthInSeconds" ma:index="19" nillable="true" ma:displayName="MediaLengthInSeconds" ma:hidden="true" ma:internalName="MediaLengthInSeconds" ma:readOnly="true">
+    <xsd:element name="MediaLengthInSeconds" ma:index="21" nillable="true" ma:displayName="MediaLengthInSeconds" ma:hidden="true" ma:internalName="MediaLengthInSeconds" ma:readOnly="true">
       <xsd:simpleType>
         <xsd:restriction base="dms:Unknown"/>
       </xsd:simpleType>
     </xsd:element>
-    <xsd:element name="lcf76f155ced4ddcb4097134ff3c332f" ma:index="21" nillable="true" ma:taxonomy="true" ma:internalName="lcf76f155ced4ddcb4097134ff3c332f" ma:taxonomyFieldName="MediaServiceImageTags" ma:displayName="Image Tags" ma:readOnly="false" ma:fieldId="{5cf76f15-5ced-4ddc-b409-7134ff3c332f}" ma:taxonomyMulti="true" ma:sspId="a3ebb39f-d69b-4575-80f5-9912993956e5" ma:termSetId="09814cd3-568e-fe90-9814-8d621ff8fb84" ma:anchorId="fba54fb3-c3e1-fe81-a776-ca4b69148c4d" ma:open="true" ma:isKeyword="false">
-      <xsd:complexType>
-        <xsd:sequence>
-          <xsd:element ref="pc:Terms" minOccurs="0" maxOccurs="1"/>
-        </xsd:sequence>
-      </xsd:complexType>
-    </xsd:element>
   </xsd:schema>
-  <xsd:schema xmlns:xsd="http://www.w3.org/2001/XMLSchema" xmlns:xs="http://www.w3.org/2001/XMLSchema" xmlns:dms="http://schemas.microsoft.com/office/2006/documentManagement/types" xmlns:pc="http://schemas.microsoft.com/office/infopath/2007/PartnerControls" targetNamespace="67e6609d-4da6-43f2-b73c-9b749e56ecda" elementFormDefault="qualified">
+  <xsd:schema xmlns:xsd="http://www.w3.org/2001/XMLSchema" xmlns:xs="http://www.w3.org/2001/XMLSchema" xmlns:dms="http://schemas.microsoft.com/office/2006/documentManagement/types" xmlns:pc="http://schemas.microsoft.com/office/infopath/2007/PartnerControls" targetNamespace="b801df0b-86be-446d-a251-5641b9beabd9" elementFormDefault="qualified">
     <xsd:import namespace="http://schemas.microsoft.com/office/2006/documentManagement/types"/>
     <xsd:import namespace="http://schemas.microsoft.com/office/infopath/2007/PartnerControls"/>
     <xsd:element name="SharedWithUsers" ma:index="12" nillable="true" ma:displayName="Shared With" ma:internalName="SharedWithUsers" ma:readOnly="true">
@@ -12522,7 +12516,7 @@
         </xsd:restriction>
       </xsd:simpleType>
     </xsd:element>
-    <xsd:element name="TaxCatchAll" ma:index="22" nillable="true" ma:displayName="Taxonomy Catch All Column" ma:hidden="true" ma:list="{a6f53592-1060-4e07-aeb7-058c13974b3e}" ma:internalName="TaxCatchAll" ma:showField="CatchAllData" ma:web="67e6609d-4da6-43f2-b73c-9b749e56ecda">
+    <xsd:element name="TaxCatchAll" ma:index="16" nillable="true" ma:displayName="Taxonomy Catch All Column" ma:hidden="true" ma:list="{7db73f65-2472-45ca-904b-1c260c69482a}" ma:internalName="TaxCatchAll" ma:showField="CatchAllData" ma:web="b801df0b-86be-446d-a251-5641b9beabd9">
       <xsd:complexType>
         <xsd:complexContent>
           <xsd:extension base="dms:MultiChoiceLookup">
@@ -12636,10 +12630,10 @@
 <file path=customXml/item3.xml><?xml version="1.0" encoding="utf-8"?>
 <p:properties xmlns:p="http://schemas.microsoft.com/office/2006/metadata/properties" xmlns:xsi="http://www.w3.org/2001/XMLSchema-instance" xmlns:pc="http://schemas.microsoft.com/office/infopath/2007/PartnerControls">
   <documentManagement>
-    <lcf76f155ced4ddcb4097134ff3c332f xmlns="25558cfc-09cb-4f21-a339-24113151f02d">
+    <lcf76f155ced4ddcb4097134ff3c332f xmlns="9f84fe44-06c1-4235-861e-8559e31132d3">
       <Terms xmlns="http://schemas.microsoft.com/office/infopath/2007/PartnerControls"/>
     </lcf76f155ced4ddcb4097134ff3c332f>
-    <TaxCatchAll xmlns="67e6609d-4da6-43f2-b73c-9b749e56ecda" xsi:nil="true"/>
+    <TaxCatchAll xmlns="b801df0b-86be-446d-a251-5641b9beabd9" xsi:nil="true"/>
   </documentManagement>
 </p:properties>
 </file>
@@ -12653,7 +12647,7 @@
 </file>
 
 <file path=customXml/itemProps2.xml><?xml version="1.0" encoding="utf-8"?>
-<ds:datastoreItem xmlns:ds="http://schemas.openxmlformats.org/officeDocument/2006/customXml" ds:itemID="{8C0272E7-64E5-46D1-BA9D-607B15B37D08}"/>
+<ds:datastoreItem xmlns:ds="http://schemas.openxmlformats.org/officeDocument/2006/customXml" ds:itemID="{04354B0C-E0BC-4C65-94F6-F01528538975}"/>
 </file>
 
 <file path=customXml/itemProps3.xml><?xml version="1.0" encoding="utf-8"?>

</xml_diff>

<commit_message>
DCWL-1159-v2 Testing the XML sample upload.
</commit_message>
<xml_diff>
--- a/public/api/conf/1.0/examples/annotated_XML_samples/Annotated_XML_Sample_Guidance_v1.3.pptx
+++ b/public/api/conf/1.0/examples/annotated_XML_samples/Annotated_XML_Sample_Guidance_v1.3.pptx
@@ -12397,10 +12397,10 @@
 </file>
 
 <file path=customXml/item2.xml><?xml version="1.0" encoding="utf-8"?>
-<ct:contentTypeSchema xmlns:ct="http://schemas.microsoft.com/office/2006/metadata/contentType" xmlns:ma="http://schemas.microsoft.com/office/2006/metadata/properties/metaAttributes" ct:_="" ma:_="" ma:contentTypeName="Document" ma:contentTypeID="0x010100E62A33F58702334EBF7311526B3DE3F0" ma:contentTypeVersion="15" ma:contentTypeDescription="Create a new document." ma:contentTypeScope="" ma:versionID="977969c0047b5e5be8638840a0ae1307">
-  <xsd:schema xmlns:xsd="http://www.w3.org/2001/XMLSchema" xmlns:xs="http://www.w3.org/2001/XMLSchema" xmlns:p="http://schemas.microsoft.com/office/2006/metadata/properties" xmlns:ns2="25558cfc-09cb-4f21-a339-24113151f02d" xmlns:ns3="67e6609d-4da6-43f2-b73c-9b749e56ecda" targetNamespace="http://schemas.microsoft.com/office/2006/metadata/properties" ma:root="true" ma:fieldsID="6efdbf2bade035783d617b88be4656c9" ns2:_="" ns3:_="">
-    <xsd:import namespace="25558cfc-09cb-4f21-a339-24113151f02d"/>
-    <xsd:import namespace="67e6609d-4da6-43f2-b73c-9b749e56ecda"/>
+<ct:contentTypeSchema xmlns:ct="http://schemas.microsoft.com/office/2006/metadata/contentType" xmlns:ma="http://schemas.microsoft.com/office/2006/metadata/properties/metaAttributes" ct:_="" ma:_="" ma:contentTypeName="Document" ma:contentTypeID="0x010100DB1CE12E84A3F5469F78394738FAA291" ma:contentTypeVersion="14" ma:contentTypeDescription="Create a new document." ma:contentTypeScope="" ma:versionID="c9571a1acdaddfe0a15ad6b04794a1f8">
+  <xsd:schema xmlns:xsd="http://www.w3.org/2001/XMLSchema" xmlns:xs="http://www.w3.org/2001/XMLSchema" xmlns:p="http://schemas.microsoft.com/office/2006/metadata/properties" xmlns:ns2="9f84fe44-06c1-4235-861e-8559e31132d3" xmlns:ns3="b801df0b-86be-446d-a251-5641b9beabd9" targetNamespace="http://schemas.microsoft.com/office/2006/metadata/properties" ma:root="true" ma:fieldsID="3695f29a245d141c2238055f86b20f5f" ns2:_="" ns3:_="">
+    <xsd:import namespace="9f84fe44-06c1-4235-861e-8559e31132d3"/>
+    <xsd:import namespace="b801df0b-86be-446d-a251-5641b9beabd9"/>
     <xsd:element name="properties">
       <xsd:complexType>
         <xsd:sequence>
@@ -12413,14 +12413,13 @@
                 <xsd:element ref="ns2:MediaServiceKeyPoints" minOccurs="0"/>
                 <xsd:element ref="ns3:SharedWithUsers" minOccurs="0"/>
                 <xsd:element ref="ns3:SharedWithDetails" minOccurs="0"/>
-                <xsd:element ref="ns2:MediaServiceAutoTags" minOccurs="0"/>
+                <xsd:element ref="ns2:lcf76f155ced4ddcb4097134ff3c332f" minOccurs="0"/>
+                <xsd:element ref="ns3:TaxCatchAll" minOccurs="0"/>
                 <xsd:element ref="ns2:MediaServiceOCR" minOccurs="0"/>
                 <xsd:element ref="ns2:MediaServiceGenerationTime" minOccurs="0"/>
                 <xsd:element ref="ns2:MediaServiceEventHashCode" minOccurs="0"/>
                 <xsd:element ref="ns2:MediaServiceDateTaken" minOccurs="0"/>
                 <xsd:element ref="ns2:MediaLengthInSeconds" minOccurs="0"/>
-                <xsd:element ref="ns2:lcf76f155ced4ddcb4097134ff3c332f" minOccurs="0"/>
-                <xsd:element ref="ns3:TaxCatchAll" minOccurs="0"/>
               </xsd:all>
             </xsd:complexType>
           </xsd:element>
@@ -12428,7 +12427,7 @@
       </xsd:complexType>
     </xsd:element>
   </xsd:schema>
-  <xsd:schema xmlns:xsd="http://www.w3.org/2001/XMLSchema" xmlns:xs="http://www.w3.org/2001/XMLSchema" xmlns:dms="http://schemas.microsoft.com/office/2006/documentManagement/types" xmlns:pc="http://schemas.microsoft.com/office/infopath/2007/PartnerControls" targetNamespace="25558cfc-09cb-4f21-a339-24113151f02d" elementFormDefault="qualified">
+  <xsd:schema xmlns:xsd="http://www.w3.org/2001/XMLSchema" xmlns:xs="http://www.w3.org/2001/XMLSchema" xmlns:dms="http://schemas.microsoft.com/office/2006/documentManagement/types" xmlns:pc="http://schemas.microsoft.com/office/infopath/2007/PartnerControls" targetNamespace="9f84fe44-06c1-4235-861e-8559e31132d3" elementFormDefault="qualified">
     <xsd:import namespace="http://schemas.microsoft.com/office/2006/documentManagement/types"/>
     <xsd:import namespace="http://schemas.microsoft.com/office/infopath/2007/PartnerControls"/>
     <xsd:element name="MediaServiceMetadata" ma:index="8" nillable="true" ma:displayName="MediaServiceMetadata" ma:hidden="true" ma:internalName="MediaServiceMetadata" ma:readOnly="true">
@@ -12453,47 +12452,42 @@
         </xsd:restriction>
       </xsd:simpleType>
     </xsd:element>
-    <xsd:element name="MediaServiceAutoTags" ma:index="14" nillable="true" ma:displayName="Tags" ma:internalName="MediaServiceAutoTags" ma:readOnly="true">
-      <xsd:simpleType>
-        <xsd:restriction base="dms:Text"/>
-      </xsd:simpleType>
+    <xsd:element name="lcf76f155ced4ddcb4097134ff3c332f" ma:index="15" nillable="true" ma:taxonomy="true" ma:internalName="lcf76f155ced4ddcb4097134ff3c332f" ma:taxonomyFieldName="MediaServiceImageTags" ma:displayName="Image Tags" ma:readOnly="false" ma:fieldId="{5cf76f15-5ced-4ddc-b409-7134ff3c332f}" ma:taxonomyMulti="true" ma:sspId="a3ebb39f-d69b-4575-80f5-9912993956e5" ma:termSetId="09814cd3-568e-fe90-9814-8d621ff8fb84" ma:anchorId="fba54fb3-c3e1-fe81-a776-ca4b69148c4d" ma:open="true" ma:isKeyword="false">
+      <xsd:complexType>
+        <xsd:sequence>
+          <xsd:element ref="pc:Terms" minOccurs="0" maxOccurs="1"/>
+        </xsd:sequence>
+      </xsd:complexType>
     </xsd:element>
-    <xsd:element name="MediaServiceOCR" ma:index="15" nillable="true" ma:displayName="Extracted Text" ma:internalName="MediaServiceOCR" ma:readOnly="true">
+    <xsd:element name="MediaServiceOCR" ma:index="17" nillable="true" ma:displayName="Extracted Text" ma:internalName="MediaServiceOCR" ma:readOnly="true">
       <xsd:simpleType>
         <xsd:restriction base="dms:Note">
           <xsd:maxLength value="255"/>
         </xsd:restriction>
       </xsd:simpleType>
     </xsd:element>
-    <xsd:element name="MediaServiceGenerationTime" ma:index="16" nillable="true" ma:displayName="MediaServiceGenerationTime" ma:hidden="true" ma:internalName="MediaServiceGenerationTime" ma:readOnly="true">
+    <xsd:element name="MediaServiceGenerationTime" ma:index="18" nillable="true" ma:displayName="MediaServiceGenerationTime" ma:hidden="true" ma:internalName="MediaServiceGenerationTime" ma:readOnly="true">
       <xsd:simpleType>
         <xsd:restriction base="dms:Text"/>
       </xsd:simpleType>
     </xsd:element>
-    <xsd:element name="MediaServiceEventHashCode" ma:index="17" nillable="true" ma:displayName="MediaServiceEventHashCode" ma:hidden="true" ma:internalName="MediaServiceEventHashCode" ma:readOnly="true">
+    <xsd:element name="MediaServiceEventHashCode" ma:index="19" nillable="true" ma:displayName="MediaServiceEventHashCode" ma:hidden="true" ma:internalName="MediaServiceEventHashCode" ma:readOnly="true">
       <xsd:simpleType>
         <xsd:restriction base="dms:Text"/>
       </xsd:simpleType>
     </xsd:element>
-    <xsd:element name="MediaServiceDateTaken" ma:index="18" nillable="true" ma:displayName="MediaServiceDateTaken" ma:hidden="true" ma:internalName="MediaServiceDateTaken" ma:readOnly="true">
+    <xsd:element name="MediaServiceDateTaken" ma:index="20" nillable="true" ma:displayName="MediaServiceDateTaken" ma:hidden="true" ma:indexed="true" ma:internalName="MediaServiceDateTaken" ma:readOnly="true">
       <xsd:simpleType>
         <xsd:restriction base="dms:Text"/>
       </xsd:simpleType>
     </xsd:element>
-    <xsd:element name="MediaLengthInSeconds" ma:index="19" nillable="true" ma:displayName="MediaLengthInSeconds" ma:hidden="true" ma:internalName="MediaLengthInSeconds" ma:readOnly="true">
+    <xsd:element name="MediaLengthInSeconds" ma:index="21" nillable="true" ma:displayName="MediaLengthInSeconds" ma:hidden="true" ma:internalName="MediaLengthInSeconds" ma:readOnly="true">
       <xsd:simpleType>
         <xsd:restriction base="dms:Unknown"/>
       </xsd:simpleType>
     </xsd:element>
-    <xsd:element name="lcf76f155ced4ddcb4097134ff3c332f" ma:index="21" nillable="true" ma:taxonomy="true" ma:internalName="lcf76f155ced4ddcb4097134ff3c332f" ma:taxonomyFieldName="MediaServiceImageTags" ma:displayName="Image Tags" ma:readOnly="false" ma:fieldId="{5cf76f15-5ced-4ddc-b409-7134ff3c332f}" ma:taxonomyMulti="true" ma:sspId="a3ebb39f-d69b-4575-80f5-9912993956e5" ma:termSetId="09814cd3-568e-fe90-9814-8d621ff8fb84" ma:anchorId="fba54fb3-c3e1-fe81-a776-ca4b69148c4d" ma:open="true" ma:isKeyword="false">
-      <xsd:complexType>
-        <xsd:sequence>
-          <xsd:element ref="pc:Terms" minOccurs="0" maxOccurs="1"/>
-        </xsd:sequence>
-      </xsd:complexType>
-    </xsd:element>
   </xsd:schema>
-  <xsd:schema xmlns:xsd="http://www.w3.org/2001/XMLSchema" xmlns:xs="http://www.w3.org/2001/XMLSchema" xmlns:dms="http://schemas.microsoft.com/office/2006/documentManagement/types" xmlns:pc="http://schemas.microsoft.com/office/infopath/2007/PartnerControls" targetNamespace="67e6609d-4da6-43f2-b73c-9b749e56ecda" elementFormDefault="qualified">
+  <xsd:schema xmlns:xsd="http://www.w3.org/2001/XMLSchema" xmlns:xs="http://www.w3.org/2001/XMLSchema" xmlns:dms="http://schemas.microsoft.com/office/2006/documentManagement/types" xmlns:pc="http://schemas.microsoft.com/office/infopath/2007/PartnerControls" targetNamespace="b801df0b-86be-446d-a251-5641b9beabd9" elementFormDefault="qualified">
     <xsd:import namespace="http://schemas.microsoft.com/office/2006/documentManagement/types"/>
     <xsd:import namespace="http://schemas.microsoft.com/office/infopath/2007/PartnerControls"/>
     <xsd:element name="SharedWithUsers" ma:index="12" nillable="true" ma:displayName="Shared With" ma:internalName="SharedWithUsers" ma:readOnly="true">
@@ -12522,7 +12516,7 @@
         </xsd:restriction>
       </xsd:simpleType>
     </xsd:element>
-    <xsd:element name="TaxCatchAll" ma:index="22" nillable="true" ma:displayName="Taxonomy Catch All Column" ma:hidden="true" ma:list="{a6f53592-1060-4e07-aeb7-058c13974b3e}" ma:internalName="TaxCatchAll" ma:showField="CatchAllData" ma:web="67e6609d-4da6-43f2-b73c-9b749e56ecda">
+    <xsd:element name="TaxCatchAll" ma:index="16" nillable="true" ma:displayName="Taxonomy Catch All Column" ma:hidden="true" ma:list="{7db73f65-2472-45ca-904b-1c260c69482a}" ma:internalName="TaxCatchAll" ma:showField="CatchAllData" ma:web="b801df0b-86be-446d-a251-5641b9beabd9">
       <xsd:complexType>
         <xsd:complexContent>
           <xsd:extension base="dms:MultiChoiceLookup">
@@ -12636,10 +12630,10 @@
 <file path=customXml/item3.xml><?xml version="1.0" encoding="utf-8"?>
 <p:properties xmlns:p="http://schemas.microsoft.com/office/2006/metadata/properties" xmlns:xsi="http://www.w3.org/2001/XMLSchema-instance" xmlns:pc="http://schemas.microsoft.com/office/infopath/2007/PartnerControls">
   <documentManagement>
-    <lcf76f155ced4ddcb4097134ff3c332f xmlns="25558cfc-09cb-4f21-a339-24113151f02d">
+    <lcf76f155ced4ddcb4097134ff3c332f xmlns="9f84fe44-06c1-4235-861e-8559e31132d3">
       <Terms xmlns="http://schemas.microsoft.com/office/infopath/2007/PartnerControls"/>
     </lcf76f155ced4ddcb4097134ff3c332f>
-    <TaxCatchAll xmlns="67e6609d-4da6-43f2-b73c-9b749e56ecda" xsi:nil="true"/>
+    <TaxCatchAll xmlns="b801df0b-86be-446d-a251-5641b9beabd9" xsi:nil="true"/>
   </documentManagement>
 </p:properties>
 </file>
@@ -12653,7 +12647,7 @@
 </file>
 
 <file path=customXml/itemProps2.xml><?xml version="1.0" encoding="utf-8"?>
-<ds:datastoreItem xmlns:ds="http://schemas.openxmlformats.org/officeDocument/2006/customXml" ds:itemID="{8C0272E7-64E5-46D1-BA9D-607B15B37D08}"/>
+<ds:datastoreItem xmlns:ds="http://schemas.openxmlformats.org/officeDocument/2006/customXml" ds:itemID="{04354B0C-E0BC-4C65-94F6-F01528538975}"/>
 </file>
 
 <file path=customXml/itemProps3.xml><?xml version="1.0" encoding="utf-8"?>

</xml_diff>

<commit_message>
DCWL-704 Updated XML samples.
</commit_message>
<xml_diff>
--- a/public/api/conf/1.0/examples/annotated_XML_samples/Annotated_XML_Sample_Guidance_v1.3.pptx
+++ b/public/api/conf/1.0/examples/annotated_XML_samples/Annotated_XML_Sample_Guidance_v1.3.pptx
@@ -12397,10 +12397,10 @@
 </file>
 
 <file path=customXml/item2.xml><?xml version="1.0" encoding="utf-8"?>
-<ct:contentTypeSchema xmlns:ct="http://schemas.microsoft.com/office/2006/metadata/contentType" xmlns:ma="http://schemas.microsoft.com/office/2006/metadata/properties/metaAttributes" ct:_="" ma:_="" ma:contentTypeName="Document" ma:contentTypeID="0x010100E62A33F58702334EBF7311526B3DE3F0" ma:contentTypeVersion="15" ma:contentTypeDescription="Create a new document." ma:contentTypeScope="" ma:versionID="977969c0047b5e5be8638840a0ae1307">
-  <xsd:schema xmlns:xsd="http://www.w3.org/2001/XMLSchema" xmlns:xs="http://www.w3.org/2001/XMLSchema" xmlns:p="http://schemas.microsoft.com/office/2006/metadata/properties" xmlns:ns2="25558cfc-09cb-4f21-a339-24113151f02d" xmlns:ns3="67e6609d-4da6-43f2-b73c-9b749e56ecda" targetNamespace="http://schemas.microsoft.com/office/2006/metadata/properties" ma:root="true" ma:fieldsID="6efdbf2bade035783d617b88be4656c9" ns2:_="" ns3:_="">
-    <xsd:import namespace="25558cfc-09cb-4f21-a339-24113151f02d"/>
-    <xsd:import namespace="67e6609d-4da6-43f2-b73c-9b749e56ecda"/>
+<ct:contentTypeSchema xmlns:ct="http://schemas.microsoft.com/office/2006/metadata/contentType" xmlns:ma="http://schemas.microsoft.com/office/2006/metadata/properties/metaAttributes" ct:_="" ma:_="" ma:contentTypeName="Document" ma:contentTypeID="0x010100DB1CE12E84A3F5469F78394738FAA291" ma:contentTypeVersion="14" ma:contentTypeDescription="Create a new document." ma:contentTypeScope="" ma:versionID="c9571a1acdaddfe0a15ad6b04794a1f8">
+  <xsd:schema xmlns:xsd="http://www.w3.org/2001/XMLSchema" xmlns:xs="http://www.w3.org/2001/XMLSchema" xmlns:p="http://schemas.microsoft.com/office/2006/metadata/properties" xmlns:ns2="9f84fe44-06c1-4235-861e-8559e31132d3" xmlns:ns3="b801df0b-86be-446d-a251-5641b9beabd9" targetNamespace="http://schemas.microsoft.com/office/2006/metadata/properties" ma:root="true" ma:fieldsID="3695f29a245d141c2238055f86b20f5f" ns2:_="" ns3:_="">
+    <xsd:import namespace="9f84fe44-06c1-4235-861e-8559e31132d3"/>
+    <xsd:import namespace="b801df0b-86be-446d-a251-5641b9beabd9"/>
     <xsd:element name="properties">
       <xsd:complexType>
         <xsd:sequence>
@@ -12413,14 +12413,13 @@
                 <xsd:element ref="ns2:MediaServiceKeyPoints" minOccurs="0"/>
                 <xsd:element ref="ns3:SharedWithUsers" minOccurs="0"/>
                 <xsd:element ref="ns3:SharedWithDetails" minOccurs="0"/>
-                <xsd:element ref="ns2:MediaServiceAutoTags" minOccurs="0"/>
+                <xsd:element ref="ns2:lcf76f155ced4ddcb4097134ff3c332f" minOccurs="0"/>
+                <xsd:element ref="ns3:TaxCatchAll" minOccurs="0"/>
                 <xsd:element ref="ns2:MediaServiceOCR" minOccurs="0"/>
                 <xsd:element ref="ns2:MediaServiceGenerationTime" minOccurs="0"/>
                 <xsd:element ref="ns2:MediaServiceEventHashCode" minOccurs="0"/>
                 <xsd:element ref="ns2:MediaServiceDateTaken" minOccurs="0"/>
                 <xsd:element ref="ns2:MediaLengthInSeconds" minOccurs="0"/>
-                <xsd:element ref="ns2:lcf76f155ced4ddcb4097134ff3c332f" minOccurs="0"/>
-                <xsd:element ref="ns3:TaxCatchAll" minOccurs="0"/>
               </xsd:all>
             </xsd:complexType>
           </xsd:element>
@@ -12428,7 +12427,7 @@
       </xsd:complexType>
     </xsd:element>
   </xsd:schema>
-  <xsd:schema xmlns:xsd="http://www.w3.org/2001/XMLSchema" xmlns:xs="http://www.w3.org/2001/XMLSchema" xmlns:dms="http://schemas.microsoft.com/office/2006/documentManagement/types" xmlns:pc="http://schemas.microsoft.com/office/infopath/2007/PartnerControls" targetNamespace="25558cfc-09cb-4f21-a339-24113151f02d" elementFormDefault="qualified">
+  <xsd:schema xmlns:xsd="http://www.w3.org/2001/XMLSchema" xmlns:xs="http://www.w3.org/2001/XMLSchema" xmlns:dms="http://schemas.microsoft.com/office/2006/documentManagement/types" xmlns:pc="http://schemas.microsoft.com/office/infopath/2007/PartnerControls" targetNamespace="9f84fe44-06c1-4235-861e-8559e31132d3" elementFormDefault="qualified">
     <xsd:import namespace="http://schemas.microsoft.com/office/2006/documentManagement/types"/>
     <xsd:import namespace="http://schemas.microsoft.com/office/infopath/2007/PartnerControls"/>
     <xsd:element name="MediaServiceMetadata" ma:index="8" nillable="true" ma:displayName="MediaServiceMetadata" ma:hidden="true" ma:internalName="MediaServiceMetadata" ma:readOnly="true">
@@ -12453,47 +12452,42 @@
         </xsd:restriction>
       </xsd:simpleType>
     </xsd:element>
-    <xsd:element name="MediaServiceAutoTags" ma:index="14" nillable="true" ma:displayName="Tags" ma:internalName="MediaServiceAutoTags" ma:readOnly="true">
-      <xsd:simpleType>
-        <xsd:restriction base="dms:Text"/>
-      </xsd:simpleType>
+    <xsd:element name="lcf76f155ced4ddcb4097134ff3c332f" ma:index="15" nillable="true" ma:taxonomy="true" ma:internalName="lcf76f155ced4ddcb4097134ff3c332f" ma:taxonomyFieldName="MediaServiceImageTags" ma:displayName="Image Tags" ma:readOnly="false" ma:fieldId="{5cf76f15-5ced-4ddc-b409-7134ff3c332f}" ma:taxonomyMulti="true" ma:sspId="a3ebb39f-d69b-4575-80f5-9912993956e5" ma:termSetId="09814cd3-568e-fe90-9814-8d621ff8fb84" ma:anchorId="fba54fb3-c3e1-fe81-a776-ca4b69148c4d" ma:open="true" ma:isKeyword="false">
+      <xsd:complexType>
+        <xsd:sequence>
+          <xsd:element ref="pc:Terms" minOccurs="0" maxOccurs="1"/>
+        </xsd:sequence>
+      </xsd:complexType>
     </xsd:element>
-    <xsd:element name="MediaServiceOCR" ma:index="15" nillable="true" ma:displayName="Extracted Text" ma:internalName="MediaServiceOCR" ma:readOnly="true">
+    <xsd:element name="MediaServiceOCR" ma:index="17" nillable="true" ma:displayName="Extracted Text" ma:internalName="MediaServiceOCR" ma:readOnly="true">
       <xsd:simpleType>
         <xsd:restriction base="dms:Note">
           <xsd:maxLength value="255"/>
         </xsd:restriction>
       </xsd:simpleType>
     </xsd:element>
-    <xsd:element name="MediaServiceGenerationTime" ma:index="16" nillable="true" ma:displayName="MediaServiceGenerationTime" ma:hidden="true" ma:internalName="MediaServiceGenerationTime" ma:readOnly="true">
+    <xsd:element name="MediaServiceGenerationTime" ma:index="18" nillable="true" ma:displayName="MediaServiceGenerationTime" ma:hidden="true" ma:internalName="MediaServiceGenerationTime" ma:readOnly="true">
       <xsd:simpleType>
         <xsd:restriction base="dms:Text"/>
       </xsd:simpleType>
     </xsd:element>
-    <xsd:element name="MediaServiceEventHashCode" ma:index="17" nillable="true" ma:displayName="MediaServiceEventHashCode" ma:hidden="true" ma:internalName="MediaServiceEventHashCode" ma:readOnly="true">
+    <xsd:element name="MediaServiceEventHashCode" ma:index="19" nillable="true" ma:displayName="MediaServiceEventHashCode" ma:hidden="true" ma:internalName="MediaServiceEventHashCode" ma:readOnly="true">
       <xsd:simpleType>
         <xsd:restriction base="dms:Text"/>
       </xsd:simpleType>
     </xsd:element>
-    <xsd:element name="MediaServiceDateTaken" ma:index="18" nillable="true" ma:displayName="MediaServiceDateTaken" ma:hidden="true" ma:internalName="MediaServiceDateTaken" ma:readOnly="true">
+    <xsd:element name="MediaServiceDateTaken" ma:index="20" nillable="true" ma:displayName="MediaServiceDateTaken" ma:hidden="true" ma:indexed="true" ma:internalName="MediaServiceDateTaken" ma:readOnly="true">
       <xsd:simpleType>
         <xsd:restriction base="dms:Text"/>
       </xsd:simpleType>
     </xsd:element>
-    <xsd:element name="MediaLengthInSeconds" ma:index="19" nillable="true" ma:displayName="MediaLengthInSeconds" ma:hidden="true" ma:internalName="MediaLengthInSeconds" ma:readOnly="true">
+    <xsd:element name="MediaLengthInSeconds" ma:index="21" nillable="true" ma:displayName="MediaLengthInSeconds" ma:hidden="true" ma:internalName="MediaLengthInSeconds" ma:readOnly="true">
       <xsd:simpleType>
         <xsd:restriction base="dms:Unknown"/>
       </xsd:simpleType>
     </xsd:element>
-    <xsd:element name="lcf76f155ced4ddcb4097134ff3c332f" ma:index="21" nillable="true" ma:taxonomy="true" ma:internalName="lcf76f155ced4ddcb4097134ff3c332f" ma:taxonomyFieldName="MediaServiceImageTags" ma:displayName="Image Tags" ma:readOnly="false" ma:fieldId="{5cf76f15-5ced-4ddc-b409-7134ff3c332f}" ma:taxonomyMulti="true" ma:sspId="a3ebb39f-d69b-4575-80f5-9912993956e5" ma:termSetId="09814cd3-568e-fe90-9814-8d621ff8fb84" ma:anchorId="fba54fb3-c3e1-fe81-a776-ca4b69148c4d" ma:open="true" ma:isKeyword="false">
-      <xsd:complexType>
-        <xsd:sequence>
-          <xsd:element ref="pc:Terms" minOccurs="0" maxOccurs="1"/>
-        </xsd:sequence>
-      </xsd:complexType>
-    </xsd:element>
   </xsd:schema>
-  <xsd:schema xmlns:xsd="http://www.w3.org/2001/XMLSchema" xmlns:xs="http://www.w3.org/2001/XMLSchema" xmlns:dms="http://schemas.microsoft.com/office/2006/documentManagement/types" xmlns:pc="http://schemas.microsoft.com/office/infopath/2007/PartnerControls" targetNamespace="67e6609d-4da6-43f2-b73c-9b749e56ecda" elementFormDefault="qualified">
+  <xsd:schema xmlns:xsd="http://www.w3.org/2001/XMLSchema" xmlns:xs="http://www.w3.org/2001/XMLSchema" xmlns:dms="http://schemas.microsoft.com/office/2006/documentManagement/types" xmlns:pc="http://schemas.microsoft.com/office/infopath/2007/PartnerControls" targetNamespace="b801df0b-86be-446d-a251-5641b9beabd9" elementFormDefault="qualified">
     <xsd:import namespace="http://schemas.microsoft.com/office/2006/documentManagement/types"/>
     <xsd:import namespace="http://schemas.microsoft.com/office/infopath/2007/PartnerControls"/>
     <xsd:element name="SharedWithUsers" ma:index="12" nillable="true" ma:displayName="Shared With" ma:internalName="SharedWithUsers" ma:readOnly="true">
@@ -12522,7 +12516,7 @@
         </xsd:restriction>
       </xsd:simpleType>
     </xsd:element>
-    <xsd:element name="TaxCatchAll" ma:index="22" nillable="true" ma:displayName="Taxonomy Catch All Column" ma:hidden="true" ma:list="{a6f53592-1060-4e07-aeb7-058c13974b3e}" ma:internalName="TaxCatchAll" ma:showField="CatchAllData" ma:web="67e6609d-4da6-43f2-b73c-9b749e56ecda">
+    <xsd:element name="TaxCatchAll" ma:index="16" nillable="true" ma:displayName="Taxonomy Catch All Column" ma:hidden="true" ma:list="{7db73f65-2472-45ca-904b-1c260c69482a}" ma:internalName="TaxCatchAll" ma:showField="CatchAllData" ma:web="b801df0b-86be-446d-a251-5641b9beabd9">
       <xsd:complexType>
         <xsd:complexContent>
           <xsd:extension base="dms:MultiChoiceLookup">
@@ -12636,10 +12630,10 @@
 <file path=customXml/item3.xml><?xml version="1.0" encoding="utf-8"?>
 <p:properties xmlns:p="http://schemas.microsoft.com/office/2006/metadata/properties" xmlns:xsi="http://www.w3.org/2001/XMLSchema-instance" xmlns:pc="http://schemas.microsoft.com/office/infopath/2007/PartnerControls">
   <documentManagement>
-    <lcf76f155ced4ddcb4097134ff3c332f xmlns="25558cfc-09cb-4f21-a339-24113151f02d">
+    <lcf76f155ced4ddcb4097134ff3c332f xmlns="9f84fe44-06c1-4235-861e-8559e31132d3">
       <Terms xmlns="http://schemas.microsoft.com/office/infopath/2007/PartnerControls"/>
     </lcf76f155ced4ddcb4097134ff3c332f>
-    <TaxCatchAll xmlns="67e6609d-4da6-43f2-b73c-9b749e56ecda" xsi:nil="true"/>
+    <TaxCatchAll xmlns="b801df0b-86be-446d-a251-5641b9beabd9" xsi:nil="true"/>
   </documentManagement>
 </p:properties>
 </file>
@@ -12653,7 +12647,7 @@
 </file>
 
 <file path=customXml/itemProps2.xml><?xml version="1.0" encoding="utf-8"?>
-<ds:datastoreItem xmlns:ds="http://schemas.openxmlformats.org/officeDocument/2006/customXml" ds:itemID="{8C0272E7-64E5-46D1-BA9D-607B15B37D08}"/>
+<ds:datastoreItem xmlns:ds="http://schemas.openxmlformats.org/officeDocument/2006/customXml" ds:itemID="{04354B0C-E0BC-4C65-94F6-F01528538975}"/>
 </file>
 
 <file path=customXml/itemProps3.xml><?xml version="1.0" encoding="utf-8"?>

</xml_diff>

<commit_message>
DCWL-1423 Update XML samples
</commit_message>
<xml_diff>
--- a/public/api/conf/1.0/examples/annotated_XML_samples/Annotated_XML_Sample_Guidance_v1.3.pptx
+++ b/public/api/conf/1.0/examples/annotated_XML_samples/Annotated_XML_Sample_Guidance_v1.3.pptx
@@ -12397,10 +12397,10 @@
 </file>
 
 <file path=customXml/item2.xml><?xml version="1.0" encoding="utf-8"?>
-<ct:contentTypeSchema xmlns:ct="http://schemas.microsoft.com/office/2006/metadata/contentType" xmlns:ma="http://schemas.microsoft.com/office/2006/metadata/properties/metaAttributes" ct:_="" ma:_="" ma:contentTypeName="Document" ma:contentTypeID="0x010100DB1CE12E84A3F5469F78394738FAA291" ma:contentTypeVersion="14" ma:contentTypeDescription="Create a new document." ma:contentTypeScope="" ma:versionID="c9571a1acdaddfe0a15ad6b04794a1f8">
-  <xsd:schema xmlns:xsd="http://www.w3.org/2001/XMLSchema" xmlns:xs="http://www.w3.org/2001/XMLSchema" xmlns:p="http://schemas.microsoft.com/office/2006/metadata/properties" xmlns:ns2="9f84fe44-06c1-4235-861e-8559e31132d3" xmlns:ns3="b801df0b-86be-446d-a251-5641b9beabd9" targetNamespace="http://schemas.microsoft.com/office/2006/metadata/properties" ma:root="true" ma:fieldsID="3695f29a245d141c2238055f86b20f5f" ns2:_="" ns3:_="">
-    <xsd:import namespace="9f84fe44-06c1-4235-861e-8559e31132d3"/>
-    <xsd:import namespace="b801df0b-86be-446d-a251-5641b9beabd9"/>
+<ct:contentTypeSchema xmlns:ct="http://schemas.microsoft.com/office/2006/metadata/contentType" xmlns:ma="http://schemas.microsoft.com/office/2006/metadata/properties/metaAttributes" ct:_="" ma:_="" ma:contentTypeName="Document" ma:contentTypeID="0x010100E62A33F58702334EBF7311526B3DE3F0" ma:contentTypeVersion="15" ma:contentTypeDescription="Create a new document." ma:contentTypeScope="" ma:versionID="977969c0047b5e5be8638840a0ae1307">
+  <xsd:schema xmlns:xsd="http://www.w3.org/2001/XMLSchema" xmlns:xs="http://www.w3.org/2001/XMLSchema" xmlns:p="http://schemas.microsoft.com/office/2006/metadata/properties" xmlns:ns2="25558cfc-09cb-4f21-a339-24113151f02d" xmlns:ns3="67e6609d-4da6-43f2-b73c-9b749e56ecda" targetNamespace="http://schemas.microsoft.com/office/2006/metadata/properties" ma:root="true" ma:fieldsID="6efdbf2bade035783d617b88be4656c9" ns2:_="" ns3:_="">
+    <xsd:import namespace="25558cfc-09cb-4f21-a339-24113151f02d"/>
+    <xsd:import namespace="67e6609d-4da6-43f2-b73c-9b749e56ecda"/>
     <xsd:element name="properties">
       <xsd:complexType>
         <xsd:sequence>
@@ -12413,13 +12413,14 @@
                 <xsd:element ref="ns2:MediaServiceKeyPoints" minOccurs="0"/>
                 <xsd:element ref="ns3:SharedWithUsers" minOccurs="0"/>
                 <xsd:element ref="ns3:SharedWithDetails" minOccurs="0"/>
-                <xsd:element ref="ns2:lcf76f155ced4ddcb4097134ff3c332f" minOccurs="0"/>
-                <xsd:element ref="ns3:TaxCatchAll" minOccurs="0"/>
+                <xsd:element ref="ns2:MediaServiceAutoTags" minOccurs="0"/>
                 <xsd:element ref="ns2:MediaServiceOCR" minOccurs="0"/>
                 <xsd:element ref="ns2:MediaServiceGenerationTime" minOccurs="0"/>
                 <xsd:element ref="ns2:MediaServiceEventHashCode" minOccurs="0"/>
                 <xsd:element ref="ns2:MediaServiceDateTaken" minOccurs="0"/>
                 <xsd:element ref="ns2:MediaLengthInSeconds" minOccurs="0"/>
+                <xsd:element ref="ns2:lcf76f155ced4ddcb4097134ff3c332f" minOccurs="0"/>
+                <xsd:element ref="ns3:TaxCatchAll" minOccurs="0"/>
               </xsd:all>
             </xsd:complexType>
           </xsd:element>
@@ -12427,7 +12428,7 @@
       </xsd:complexType>
     </xsd:element>
   </xsd:schema>
-  <xsd:schema xmlns:xsd="http://www.w3.org/2001/XMLSchema" xmlns:xs="http://www.w3.org/2001/XMLSchema" xmlns:dms="http://schemas.microsoft.com/office/2006/documentManagement/types" xmlns:pc="http://schemas.microsoft.com/office/infopath/2007/PartnerControls" targetNamespace="9f84fe44-06c1-4235-861e-8559e31132d3" elementFormDefault="qualified">
+  <xsd:schema xmlns:xsd="http://www.w3.org/2001/XMLSchema" xmlns:xs="http://www.w3.org/2001/XMLSchema" xmlns:dms="http://schemas.microsoft.com/office/2006/documentManagement/types" xmlns:pc="http://schemas.microsoft.com/office/infopath/2007/PartnerControls" targetNamespace="25558cfc-09cb-4f21-a339-24113151f02d" elementFormDefault="qualified">
     <xsd:import namespace="http://schemas.microsoft.com/office/2006/documentManagement/types"/>
     <xsd:import namespace="http://schemas.microsoft.com/office/infopath/2007/PartnerControls"/>
     <xsd:element name="MediaServiceMetadata" ma:index="8" nillable="true" ma:displayName="MediaServiceMetadata" ma:hidden="true" ma:internalName="MediaServiceMetadata" ma:readOnly="true">
@@ -12452,42 +12453,47 @@
         </xsd:restriction>
       </xsd:simpleType>
     </xsd:element>
-    <xsd:element name="lcf76f155ced4ddcb4097134ff3c332f" ma:index="15" nillable="true" ma:taxonomy="true" ma:internalName="lcf76f155ced4ddcb4097134ff3c332f" ma:taxonomyFieldName="MediaServiceImageTags" ma:displayName="Image Tags" ma:readOnly="false" ma:fieldId="{5cf76f15-5ced-4ddc-b409-7134ff3c332f}" ma:taxonomyMulti="true" ma:sspId="a3ebb39f-d69b-4575-80f5-9912993956e5" ma:termSetId="09814cd3-568e-fe90-9814-8d621ff8fb84" ma:anchorId="fba54fb3-c3e1-fe81-a776-ca4b69148c4d" ma:open="true" ma:isKeyword="false">
+    <xsd:element name="MediaServiceAutoTags" ma:index="14" nillable="true" ma:displayName="Tags" ma:internalName="MediaServiceAutoTags" ma:readOnly="true">
+      <xsd:simpleType>
+        <xsd:restriction base="dms:Text"/>
+      </xsd:simpleType>
+    </xsd:element>
+    <xsd:element name="MediaServiceOCR" ma:index="15" nillable="true" ma:displayName="Extracted Text" ma:internalName="MediaServiceOCR" ma:readOnly="true">
+      <xsd:simpleType>
+        <xsd:restriction base="dms:Note">
+          <xsd:maxLength value="255"/>
+        </xsd:restriction>
+      </xsd:simpleType>
+    </xsd:element>
+    <xsd:element name="MediaServiceGenerationTime" ma:index="16" nillable="true" ma:displayName="MediaServiceGenerationTime" ma:hidden="true" ma:internalName="MediaServiceGenerationTime" ma:readOnly="true">
+      <xsd:simpleType>
+        <xsd:restriction base="dms:Text"/>
+      </xsd:simpleType>
+    </xsd:element>
+    <xsd:element name="MediaServiceEventHashCode" ma:index="17" nillable="true" ma:displayName="MediaServiceEventHashCode" ma:hidden="true" ma:internalName="MediaServiceEventHashCode" ma:readOnly="true">
+      <xsd:simpleType>
+        <xsd:restriction base="dms:Text"/>
+      </xsd:simpleType>
+    </xsd:element>
+    <xsd:element name="MediaServiceDateTaken" ma:index="18" nillable="true" ma:displayName="MediaServiceDateTaken" ma:hidden="true" ma:internalName="MediaServiceDateTaken" ma:readOnly="true">
+      <xsd:simpleType>
+        <xsd:restriction base="dms:Text"/>
+      </xsd:simpleType>
+    </xsd:element>
+    <xsd:element name="MediaLengthInSeconds" ma:index="19" nillable="true" ma:displayName="MediaLengthInSeconds" ma:hidden="true" ma:internalName="MediaLengthInSeconds" ma:readOnly="true">
+      <xsd:simpleType>
+        <xsd:restriction base="dms:Unknown"/>
+      </xsd:simpleType>
+    </xsd:element>
+    <xsd:element name="lcf76f155ced4ddcb4097134ff3c332f" ma:index="21" nillable="true" ma:taxonomy="true" ma:internalName="lcf76f155ced4ddcb4097134ff3c332f" ma:taxonomyFieldName="MediaServiceImageTags" ma:displayName="Image Tags" ma:readOnly="false" ma:fieldId="{5cf76f15-5ced-4ddc-b409-7134ff3c332f}" ma:taxonomyMulti="true" ma:sspId="a3ebb39f-d69b-4575-80f5-9912993956e5" ma:termSetId="09814cd3-568e-fe90-9814-8d621ff8fb84" ma:anchorId="fba54fb3-c3e1-fe81-a776-ca4b69148c4d" ma:open="true" ma:isKeyword="false">
       <xsd:complexType>
         <xsd:sequence>
           <xsd:element ref="pc:Terms" minOccurs="0" maxOccurs="1"/>
         </xsd:sequence>
       </xsd:complexType>
     </xsd:element>
-    <xsd:element name="MediaServiceOCR" ma:index="17" nillable="true" ma:displayName="Extracted Text" ma:internalName="MediaServiceOCR" ma:readOnly="true">
-      <xsd:simpleType>
-        <xsd:restriction base="dms:Note">
-          <xsd:maxLength value="255"/>
-        </xsd:restriction>
-      </xsd:simpleType>
-    </xsd:element>
-    <xsd:element name="MediaServiceGenerationTime" ma:index="18" nillable="true" ma:displayName="MediaServiceGenerationTime" ma:hidden="true" ma:internalName="MediaServiceGenerationTime" ma:readOnly="true">
-      <xsd:simpleType>
-        <xsd:restriction base="dms:Text"/>
-      </xsd:simpleType>
-    </xsd:element>
-    <xsd:element name="MediaServiceEventHashCode" ma:index="19" nillable="true" ma:displayName="MediaServiceEventHashCode" ma:hidden="true" ma:internalName="MediaServiceEventHashCode" ma:readOnly="true">
-      <xsd:simpleType>
-        <xsd:restriction base="dms:Text"/>
-      </xsd:simpleType>
-    </xsd:element>
-    <xsd:element name="MediaServiceDateTaken" ma:index="20" nillable="true" ma:displayName="MediaServiceDateTaken" ma:hidden="true" ma:indexed="true" ma:internalName="MediaServiceDateTaken" ma:readOnly="true">
-      <xsd:simpleType>
-        <xsd:restriction base="dms:Text"/>
-      </xsd:simpleType>
-    </xsd:element>
-    <xsd:element name="MediaLengthInSeconds" ma:index="21" nillable="true" ma:displayName="MediaLengthInSeconds" ma:hidden="true" ma:internalName="MediaLengthInSeconds" ma:readOnly="true">
-      <xsd:simpleType>
-        <xsd:restriction base="dms:Unknown"/>
-      </xsd:simpleType>
-    </xsd:element>
   </xsd:schema>
-  <xsd:schema xmlns:xsd="http://www.w3.org/2001/XMLSchema" xmlns:xs="http://www.w3.org/2001/XMLSchema" xmlns:dms="http://schemas.microsoft.com/office/2006/documentManagement/types" xmlns:pc="http://schemas.microsoft.com/office/infopath/2007/PartnerControls" targetNamespace="b801df0b-86be-446d-a251-5641b9beabd9" elementFormDefault="qualified">
+  <xsd:schema xmlns:xsd="http://www.w3.org/2001/XMLSchema" xmlns:xs="http://www.w3.org/2001/XMLSchema" xmlns:dms="http://schemas.microsoft.com/office/2006/documentManagement/types" xmlns:pc="http://schemas.microsoft.com/office/infopath/2007/PartnerControls" targetNamespace="67e6609d-4da6-43f2-b73c-9b749e56ecda" elementFormDefault="qualified">
     <xsd:import namespace="http://schemas.microsoft.com/office/2006/documentManagement/types"/>
     <xsd:import namespace="http://schemas.microsoft.com/office/infopath/2007/PartnerControls"/>
     <xsd:element name="SharedWithUsers" ma:index="12" nillable="true" ma:displayName="Shared With" ma:internalName="SharedWithUsers" ma:readOnly="true">
@@ -12516,7 +12522,7 @@
         </xsd:restriction>
       </xsd:simpleType>
     </xsd:element>
-    <xsd:element name="TaxCatchAll" ma:index="16" nillable="true" ma:displayName="Taxonomy Catch All Column" ma:hidden="true" ma:list="{7db73f65-2472-45ca-904b-1c260c69482a}" ma:internalName="TaxCatchAll" ma:showField="CatchAllData" ma:web="b801df0b-86be-446d-a251-5641b9beabd9">
+    <xsd:element name="TaxCatchAll" ma:index="22" nillable="true" ma:displayName="Taxonomy Catch All Column" ma:hidden="true" ma:list="{a6f53592-1060-4e07-aeb7-058c13974b3e}" ma:internalName="TaxCatchAll" ma:showField="CatchAllData" ma:web="67e6609d-4da6-43f2-b73c-9b749e56ecda">
       <xsd:complexType>
         <xsd:complexContent>
           <xsd:extension base="dms:MultiChoiceLookup">
@@ -12630,10 +12636,10 @@
 <file path=customXml/item3.xml><?xml version="1.0" encoding="utf-8"?>
 <p:properties xmlns:p="http://schemas.microsoft.com/office/2006/metadata/properties" xmlns:xsi="http://www.w3.org/2001/XMLSchema-instance" xmlns:pc="http://schemas.microsoft.com/office/infopath/2007/PartnerControls">
   <documentManagement>
-    <lcf76f155ced4ddcb4097134ff3c332f xmlns="9f84fe44-06c1-4235-861e-8559e31132d3">
+    <lcf76f155ced4ddcb4097134ff3c332f xmlns="25558cfc-09cb-4f21-a339-24113151f02d">
       <Terms xmlns="http://schemas.microsoft.com/office/infopath/2007/PartnerControls"/>
     </lcf76f155ced4ddcb4097134ff3c332f>
-    <TaxCatchAll xmlns="b801df0b-86be-446d-a251-5641b9beabd9" xsi:nil="true"/>
+    <TaxCatchAll xmlns="67e6609d-4da6-43f2-b73c-9b749e56ecda" xsi:nil="true"/>
   </documentManagement>
 </p:properties>
 </file>
@@ -12647,7 +12653,7 @@
 </file>
 
 <file path=customXml/itemProps2.xml><?xml version="1.0" encoding="utf-8"?>
-<ds:datastoreItem xmlns:ds="http://schemas.openxmlformats.org/officeDocument/2006/customXml" ds:itemID="{04354B0C-E0BC-4C65-94F6-F01528538975}"/>
+<ds:datastoreItem xmlns:ds="http://schemas.openxmlformats.org/officeDocument/2006/customXml" ds:itemID="{8C0272E7-64E5-46D1-BA9D-607B15B37D08}"/>
 </file>
 
 <file path=customXml/itemProps3.xml><?xml version="1.0" encoding="utf-8"?>

</xml_diff>

<commit_message>
DCWL-4481 | Update XML Samples
</commit_message>
<xml_diff>
--- a/public/api/conf/1.0/examples/annotated_XML_samples/Annotated_XML_Sample_Guidance_v1.3.pptx
+++ b/public/api/conf/1.0/examples/annotated_XML_samples/Annotated_XML_Sample_Guidance_v1.3.pptx
@@ -12397,10 +12397,11 @@
 </file>
 
 <file path=customXml/item2.xml><?xml version="1.0" encoding="utf-8"?>
-<ct:contentTypeSchema xmlns:ct="http://schemas.microsoft.com/office/2006/metadata/contentType" xmlns:ma="http://schemas.microsoft.com/office/2006/metadata/properties/metaAttributes" ct:_="" ma:_="" ma:contentTypeName="Document" ma:contentTypeID="0x010100E62A33F58702334EBF7311526B3DE3F0" ma:contentTypeVersion="15" ma:contentTypeDescription="Create a new document." ma:contentTypeScope="" ma:versionID="977969c0047b5e5be8638840a0ae1307">
-  <xsd:schema xmlns:xsd="http://www.w3.org/2001/XMLSchema" xmlns:xs="http://www.w3.org/2001/XMLSchema" xmlns:p="http://schemas.microsoft.com/office/2006/metadata/properties" xmlns:ns2="25558cfc-09cb-4f21-a339-24113151f02d" xmlns:ns3="67e6609d-4da6-43f2-b73c-9b749e56ecda" targetNamespace="http://schemas.microsoft.com/office/2006/metadata/properties" ma:root="true" ma:fieldsID="6efdbf2bade035783d617b88be4656c9" ns2:_="" ns3:_="">
-    <xsd:import namespace="25558cfc-09cb-4f21-a339-24113151f02d"/>
-    <xsd:import namespace="67e6609d-4da6-43f2-b73c-9b749e56ecda"/>
+<ct:contentTypeSchema xmlns:ct="http://schemas.microsoft.com/office/2006/metadata/contentType" xmlns:ma="http://schemas.microsoft.com/office/2006/metadata/properties/metaAttributes" ct:_="" ma:_="" ma:contentTypeName="Document" ma:contentTypeID="0x010100B9B6227A1C823E4CAF14D4577B45949E" ma:contentTypeVersion="19" ma:contentTypeDescription="Create a new document." ma:contentTypeScope="" ma:versionID="908e834e9b5bb1fda22c80f8c8128b7a">
+  <xsd:schema xmlns:xsd="http://www.w3.org/2001/XMLSchema" xmlns:xs="http://www.w3.org/2001/XMLSchema" xmlns:p="http://schemas.microsoft.com/office/2006/metadata/properties" xmlns:ns1="http://schemas.microsoft.com/sharepoint/v3" xmlns:ns2="ab1752b4-7f55-4279-8f58-7cb04b745f69" xmlns:ns3="85501699-eeeb-42a5-8a52-bd04b8e60049" targetNamespace="http://schemas.microsoft.com/office/2006/metadata/properties" ma:root="true" ma:fieldsID="b344f1a9d12efe7c83bd667cde151a7c" ns1:_="" ns2:_="" ns3:_="">
+    <xsd:import namespace="http://schemas.microsoft.com/sharepoint/v3"/>
+    <xsd:import namespace="ab1752b4-7f55-4279-8f58-7cb04b745f69"/>
+    <xsd:import namespace="85501699-eeeb-42a5-8a52-bd04b8e60049"/>
     <xsd:element name="properties">
       <xsd:complexType>
         <xsd:sequence>
@@ -12411,16 +12412,20 @@
                 <xsd:element ref="ns2:MediaServiceFastMetadata" minOccurs="0"/>
                 <xsd:element ref="ns2:MediaServiceAutoKeyPoints" minOccurs="0"/>
                 <xsd:element ref="ns2:MediaServiceKeyPoints" minOccurs="0"/>
-                <xsd:element ref="ns3:SharedWithUsers" minOccurs="0"/>
-                <xsd:element ref="ns3:SharedWithDetails" minOccurs="0"/>
                 <xsd:element ref="ns2:MediaServiceAutoTags" minOccurs="0"/>
                 <xsd:element ref="ns2:MediaServiceOCR" minOccurs="0"/>
                 <xsd:element ref="ns2:MediaServiceGenerationTime" minOccurs="0"/>
                 <xsd:element ref="ns2:MediaServiceEventHashCode" minOccurs="0"/>
                 <xsd:element ref="ns2:MediaServiceDateTaken" minOccurs="0"/>
                 <xsd:element ref="ns2:MediaLengthInSeconds" minOccurs="0"/>
+                <xsd:element ref="ns3:SharedWithUsers" minOccurs="0"/>
+                <xsd:element ref="ns3:SharedWithDetails" minOccurs="0"/>
                 <xsd:element ref="ns2:lcf76f155ced4ddcb4097134ff3c332f" minOccurs="0"/>
                 <xsd:element ref="ns3:TaxCatchAll" minOccurs="0"/>
+                <xsd:element ref="ns1:_ip_UnifiedCompliancePolicyProperties" minOccurs="0"/>
+                <xsd:element ref="ns1:_ip_UnifiedCompliancePolicyUIAction" minOccurs="0"/>
+                <xsd:element ref="ns2:MediaServiceObjectDetectorVersions" minOccurs="0"/>
+                <xsd:element ref="ns2:MediaServiceSearchProperties" minOccurs="0"/>
               </xsd:all>
             </xsd:complexType>
           </xsd:element>
@@ -12428,7 +12433,21 @@
       </xsd:complexType>
     </xsd:element>
   </xsd:schema>
-  <xsd:schema xmlns:xsd="http://www.w3.org/2001/XMLSchema" xmlns:xs="http://www.w3.org/2001/XMLSchema" xmlns:dms="http://schemas.microsoft.com/office/2006/documentManagement/types" xmlns:pc="http://schemas.microsoft.com/office/infopath/2007/PartnerControls" targetNamespace="25558cfc-09cb-4f21-a339-24113151f02d" elementFormDefault="qualified">
+  <xsd:schema xmlns:xsd="http://www.w3.org/2001/XMLSchema" xmlns:xs="http://www.w3.org/2001/XMLSchema" xmlns:dms="http://schemas.microsoft.com/office/2006/documentManagement/types" xmlns:pc="http://schemas.microsoft.com/office/infopath/2007/PartnerControls" targetNamespace="http://schemas.microsoft.com/sharepoint/v3" elementFormDefault="qualified">
+    <xsd:import namespace="http://schemas.microsoft.com/office/2006/documentManagement/types"/>
+    <xsd:import namespace="http://schemas.microsoft.com/office/infopath/2007/PartnerControls"/>
+    <xsd:element name="_ip_UnifiedCompliancePolicyProperties" ma:index="23" nillable="true" ma:displayName="Unified Compliance Policy Properties" ma:hidden="true" ma:internalName="_ip_UnifiedCompliancePolicyProperties">
+      <xsd:simpleType>
+        <xsd:restriction base="dms:Note"/>
+      </xsd:simpleType>
+    </xsd:element>
+    <xsd:element name="_ip_UnifiedCompliancePolicyUIAction" ma:index="24" nillable="true" ma:displayName="Unified Compliance Policy UI Action" ma:hidden="true" ma:internalName="_ip_UnifiedCompliancePolicyUIAction">
+      <xsd:simpleType>
+        <xsd:restriction base="dms:Text"/>
+      </xsd:simpleType>
+    </xsd:element>
+  </xsd:schema>
+  <xsd:schema xmlns:xsd="http://www.w3.org/2001/XMLSchema" xmlns:xs="http://www.w3.org/2001/XMLSchema" xmlns:dms="http://schemas.microsoft.com/office/2006/documentManagement/types" xmlns:pc="http://schemas.microsoft.com/office/infopath/2007/PartnerControls" targetNamespace="ab1752b4-7f55-4279-8f58-7cb04b745f69" elementFormDefault="qualified">
     <xsd:import namespace="http://schemas.microsoft.com/office/2006/documentManagement/types"/>
     <xsd:import namespace="http://schemas.microsoft.com/office/infopath/2007/PartnerControls"/>
     <xsd:element name="MediaServiceMetadata" ma:index="8" nillable="true" ma:displayName="MediaServiceMetadata" ma:hidden="true" ma:internalName="MediaServiceMetadata" ma:readOnly="true">
@@ -12453,34 +12472,34 @@
         </xsd:restriction>
       </xsd:simpleType>
     </xsd:element>
-    <xsd:element name="MediaServiceAutoTags" ma:index="14" nillable="true" ma:displayName="Tags" ma:internalName="MediaServiceAutoTags" ma:readOnly="true">
+    <xsd:element name="MediaServiceAutoTags" ma:index="12" nillable="true" ma:displayName="Tags" ma:internalName="MediaServiceAutoTags" ma:readOnly="true">
       <xsd:simpleType>
         <xsd:restriction base="dms:Text"/>
       </xsd:simpleType>
     </xsd:element>
-    <xsd:element name="MediaServiceOCR" ma:index="15" nillable="true" ma:displayName="Extracted Text" ma:internalName="MediaServiceOCR" ma:readOnly="true">
+    <xsd:element name="MediaServiceOCR" ma:index="13" nillable="true" ma:displayName="Extracted Text" ma:internalName="MediaServiceOCR" ma:readOnly="true">
       <xsd:simpleType>
         <xsd:restriction base="dms:Note">
           <xsd:maxLength value="255"/>
         </xsd:restriction>
       </xsd:simpleType>
     </xsd:element>
-    <xsd:element name="MediaServiceGenerationTime" ma:index="16" nillable="true" ma:displayName="MediaServiceGenerationTime" ma:hidden="true" ma:internalName="MediaServiceGenerationTime" ma:readOnly="true">
+    <xsd:element name="MediaServiceGenerationTime" ma:index="14" nillable="true" ma:displayName="MediaServiceGenerationTime" ma:hidden="true" ma:internalName="MediaServiceGenerationTime" ma:readOnly="true">
       <xsd:simpleType>
         <xsd:restriction base="dms:Text"/>
       </xsd:simpleType>
     </xsd:element>
-    <xsd:element name="MediaServiceEventHashCode" ma:index="17" nillable="true" ma:displayName="MediaServiceEventHashCode" ma:hidden="true" ma:internalName="MediaServiceEventHashCode" ma:readOnly="true">
+    <xsd:element name="MediaServiceEventHashCode" ma:index="15" nillable="true" ma:displayName="MediaServiceEventHashCode" ma:hidden="true" ma:internalName="MediaServiceEventHashCode" ma:readOnly="true">
       <xsd:simpleType>
         <xsd:restriction base="dms:Text"/>
       </xsd:simpleType>
     </xsd:element>
-    <xsd:element name="MediaServiceDateTaken" ma:index="18" nillable="true" ma:displayName="MediaServiceDateTaken" ma:hidden="true" ma:internalName="MediaServiceDateTaken" ma:readOnly="true">
+    <xsd:element name="MediaServiceDateTaken" ma:index="16" nillable="true" ma:displayName="MediaServiceDateTaken" ma:hidden="true" ma:internalName="MediaServiceDateTaken" ma:readOnly="true">
       <xsd:simpleType>
         <xsd:restriction base="dms:Text"/>
       </xsd:simpleType>
     </xsd:element>
-    <xsd:element name="MediaLengthInSeconds" ma:index="19" nillable="true" ma:displayName="MediaLengthInSeconds" ma:hidden="true" ma:internalName="MediaLengthInSeconds" ma:readOnly="true">
+    <xsd:element name="MediaLengthInSeconds" ma:index="17" nillable="true" ma:displayName="MediaLengthInSeconds" ma:hidden="true" ma:internalName="MediaLengthInSeconds" ma:readOnly="true">
       <xsd:simpleType>
         <xsd:restriction base="dms:Unknown"/>
       </xsd:simpleType>
@@ -12492,11 +12511,21 @@
         </xsd:sequence>
       </xsd:complexType>
     </xsd:element>
+    <xsd:element name="MediaServiceObjectDetectorVersions" ma:index="25" nillable="true" ma:displayName="MediaServiceObjectDetectorVersions" ma:hidden="true" ma:indexed="true" ma:internalName="MediaServiceObjectDetectorVersions" ma:readOnly="true">
+      <xsd:simpleType>
+        <xsd:restriction base="dms:Text"/>
+      </xsd:simpleType>
+    </xsd:element>
+    <xsd:element name="MediaServiceSearchProperties" ma:index="26" nillable="true" ma:displayName="MediaServiceSearchProperties" ma:hidden="true" ma:internalName="MediaServiceSearchProperties" ma:readOnly="true">
+      <xsd:simpleType>
+        <xsd:restriction base="dms:Note"/>
+      </xsd:simpleType>
+    </xsd:element>
   </xsd:schema>
-  <xsd:schema xmlns:xsd="http://www.w3.org/2001/XMLSchema" xmlns:xs="http://www.w3.org/2001/XMLSchema" xmlns:dms="http://schemas.microsoft.com/office/2006/documentManagement/types" xmlns:pc="http://schemas.microsoft.com/office/infopath/2007/PartnerControls" targetNamespace="67e6609d-4da6-43f2-b73c-9b749e56ecda" elementFormDefault="qualified">
+  <xsd:schema xmlns:xsd="http://www.w3.org/2001/XMLSchema" xmlns:xs="http://www.w3.org/2001/XMLSchema" xmlns:dms="http://schemas.microsoft.com/office/2006/documentManagement/types" xmlns:pc="http://schemas.microsoft.com/office/infopath/2007/PartnerControls" targetNamespace="85501699-eeeb-42a5-8a52-bd04b8e60049" elementFormDefault="qualified">
     <xsd:import namespace="http://schemas.microsoft.com/office/2006/documentManagement/types"/>
     <xsd:import namespace="http://schemas.microsoft.com/office/infopath/2007/PartnerControls"/>
-    <xsd:element name="SharedWithUsers" ma:index="12" nillable="true" ma:displayName="Shared With" ma:internalName="SharedWithUsers" ma:readOnly="true">
+    <xsd:element name="SharedWithUsers" ma:index="18" nillable="true" ma:displayName="Shared With" ma:internalName="SharedWithUsers" ma:readOnly="true">
       <xsd:complexType>
         <xsd:complexContent>
           <xsd:extension base="dms:UserMulti">
@@ -12515,14 +12544,14 @@
         </xsd:complexContent>
       </xsd:complexType>
     </xsd:element>
-    <xsd:element name="SharedWithDetails" ma:index="13" nillable="true" ma:displayName="Shared With Details" ma:internalName="SharedWithDetails" ma:readOnly="true">
+    <xsd:element name="SharedWithDetails" ma:index="19" nillable="true" ma:displayName="Shared With Details" ma:internalName="SharedWithDetails" ma:readOnly="true">
       <xsd:simpleType>
         <xsd:restriction base="dms:Note">
           <xsd:maxLength value="255"/>
         </xsd:restriction>
       </xsd:simpleType>
     </xsd:element>
-    <xsd:element name="TaxCatchAll" ma:index="22" nillable="true" ma:displayName="Taxonomy Catch All Column" ma:hidden="true" ma:list="{a6f53592-1060-4e07-aeb7-058c13974b3e}" ma:internalName="TaxCatchAll" ma:showField="CatchAllData" ma:web="67e6609d-4da6-43f2-b73c-9b749e56ecda">
+    <xsd:element name="TaxCatchAll" ma:index="22" nillable="true" ma:displayName="Taxonomy Catch All Column" ma:hidden="true" ma:list="{4f4fd1c5-1e9f-4007-a5a9-81264056e6c1}" ma:internalName="TaxCatchAll" ma:showField="CatchAllData" ma:web="85501699-eeeb-42a5-8a52-bd04b8e60049">
       <xsd:complexType>
         <xsd:complexContent>
           <xsd:extension base="dms:MultiChoiceLookup">
@@ -12636,10 +12665,12 @@
 <file path=customXml/item3.xml><?xml version="1.0" encoding="utf-8"?>
 <p:properties xmlns:p="http://schemas.microsoft.com/office/2006/metadata/properties" xmlns:xsi="http://www.w3.org/2001/XMLSchema-instance" xmlns:pc="http://schemas.microsoft.com/office/infopath/2007/PartnerControls">
   <documentManagement>
-    <lcf76f155ced4ddcb4097134ff3c332f xmlns="25558cfc-09cb-4f21-a339-24113151f02d">
+    <lcf76f155ced4ddcb4097134ff3c332f xmlns="ab1752b4-7f55-4279-8f58-7cb04b745f69">
       <Terms xmlns="http://schemas.microsoft.com/office/infopath/2007/PartnerControls"/>
     </lcf76f155ced4ddcb4097134ff3c332f>
-    <TaxCatchAll xmlns="67e6609d-4da6-43f2-b73c-9b749e56ecda" xsi:nil="true"/>
+    <TaxCatchAll xmlns="85501699-eeeb-42a5-8a52-bd04b8e60049" xsi:nil="true"/>
+    <_ip_UnifiedCompliancePolicyUIAction xmlns="http://schemas.microsoft.com/sharepoint/v3" xsi:nil="true"/>
+    <_ip_UnifiedCompliancePolicyProperties xmlns="http://schemas.microsoft.com/sharepoint/v3" xsi:nil="true"/>
   </documentManagement>
 </p:properties>
 </file>
@@ -12653,7 +12684,7 @@
 </file>
 
 <file path=customXml/itemProps2.xml><?xml version="1.0" encoding="utf-8"?>
-<ds:datastoreItem xmlns:ds="http://schemas.openxmlformats.org/officeDocument/2006/customXml" ds:itemID="{8C0272E7-64E5-46D1-BA9D-607B15B37D08}"/>
+<ds:datastoreItem xmlns:ds="http://schemas.openxmlformats.org/officeDocument/2006/customXml" ds:itemID="{79F3FB23-CA62-4700-B586-70550DF1214E}"/>
 </file>
 
 <file path=customXml/itemProps3.xml><?xml version="1.0" encoding="utf-8"?>

</xml_diff>

<commit_message>
DCWL-4481 | Update XML Samples (#549)
</commit_message>
<xml_diff>
--- a/public/api/conf/1.0/examples/annotated_XML_samples/Annotated_XML_Sample_Guidance_v1.3.pptx
+++ b/public/api/conf/1.0/examples/annotated_XML_samples/Annotated_XML_Sample_Guidance_v1.3.pptx
@@ -12397,10 +12397,11 @@
 </file>
 
 <file path=customXml/item2.xml><?xml version="1.0" encoding="utf-8"?>
-<ct:contentTypeSchema xmlns:ct="http://schemas.microsoft.com/office/2006/metadata/contentType" xmlns:ma="http://schemas.microsoft.com/office/2006/metadata/properties/metaAttributes" ct:_="" ma:_="" ma:contentTypeName="Document" ma:contentTypeID="0x010100E62A33F58702334EBF7311526B3DE3F0" ma:contentTypeVersion="15" ma:contentTypeDescription="Create a new document." ma:contentTypeScope="" ma:versionID="977969c0047b5e5be8638840a0ae1307">
-  <xsd:schema xmlns:xsd="http://www.w3.org/2001/XMLSchema" xmlns:xs="http://www.w3.org/2001/XMLSchema" xmlns:p="http://schemas.microsoft.com/office/2006/metadata/properties" xmlns:ns2="25558cfc-09cb-4f21-a339-24113151f02d" xmlns:ns3="67e6609d-4da6-43f2-b73c-9b749e56ecda" targetNamespace="http://schemas.microsoft.com/office/2006/metadata/properties" ma:root="true" ma:fieldsID="6efdbf2bade035783d617b88be4656c9" ns2:_="" ns3:_="">
-    <xsd:import namespace="25558cfc-09cb-4f21-a339-24113151f02d"/>
-    <xsd:import namespace="67e6609d-4da6-43f2-b73c-9b749e56ecda"/>
+<ct:contentTypeSchema xmlns:ct="http://schemas.microsoft.com/office/2006/metadata/contentType" xmlns:ma="http://schemas.microsoft.com/office/2006/metadata/properties/metaAttributes" ct:_="" ma:_="" ma:contentTypeName="Document" ma:contentTypeID="0x010100B9B6227A1C823E4CAF14D4577B45949E" ma:contentTypeVersion="19" ma:contentTypeDescription="Create a new document." ma:contentTypeScope="" ma:versionID="908e834e9b5bb1fda22c80f8c8128b7a">
+  <xsd:schema xmlns:xsd="http://www.w3.org/2001/XMLSchema" xmlns:xs="http://www.w3.org/2001/XMLSchema" xmlns:p="http://schemas.microsoft.com/office/2006/metadata/properties" xmlns:ns1="http://schemas.microsoft.com/sharepoint/v3" xmlns:ns2="ab1752b4-7f55-4279-8f58-7cb04b745f69" xmlns:ns3="85501699-eeeb-42a5-8a52-bd04b8e60049" targetNamespace="http://schemas.microsoft.com/office/2006/metadata/properties" ma:root="true" ma:fieldsID="b344f1a9d12efe7c83bd667cde151a7c" ns1:_="" ns2:_="" ns3:_="">
+    <xsd:import namespace="http://schemas.microsoft.com/sharepoint/v3"/>
+    <xsd:import namespace="ab1752b4-7f55-4279-8f58-7cb04b745f69"/>
+    <xsd:import namespace="85501699-eeeb-42a5-8a52-bd04b8e60049"/>
     <xsd:element name="properties">
       <xsd:complexType>
         <xsd:sequence>
@@ -12411,16 +12412,20 @@
                 <xsd:element ref="ns2:MediaServiceFastMetadata" minOccurs="0"/>
                 <xsd:element ref="ns2:MediaServiceAutoKeyPoints" minOccurs="0"/>
                 <xsd:element ref="ns2:MediaServiceKeyPoints" minOccurs="0"/>
-                <xsd:element ref="ns3:SharedWithUsers" minOccurs="0"/>
-                <xsd:element ref="ns3:SharedWithDetails" minOccurs="0"/>
                 <xsd:element ref="ns2:MediaServiceAutoTags" minOccurs="0"/>
                 <xsd:element ref="ns2:MediaServiceOCR" minOccurs="0"/>
                 <xsd:element ref="ns2:MediaServiceGenerationTime" minOccurs="0"/>
                 <xsd:element ref="ns2:MediaServiceEventHashCode" minOccurs="0"/>
                 <xsd:element ref="ns2:MediaServiceDateTaken" minOccurs="0"/>
                 <xsd:element ref="ns2:MediaLengthInSeconds" minOccurs="0"/>
+                <xsd:element ref="ns3:SharedWithUsers" minOccurs="0"/>
+                <xsd:element ref="ns3:SharedWithDetails" minOccurs="0"/>
                 <xsd:element ref="ns2:lcf76f155ced4ddcb4097134ff3c332f" minOccurs="0"/>
                 <xsd:element ref="ns3:TaxCatchAll" minOccurs="0"/>
+                <xsd:element ref="ns1:_ip_UnifiedCompliancePolicyProperties" minOccurs="0"/>
+                <xsd:element ref="ns1:_ip_UnifiedCompliancePolicyUIAction" minOccurs="0"/>
+                <xsd:element ref="ns2:MediaServiceObjectDetectorVersions" minOccurs="0"/>
+                <xsd:element ref="ns2:MediaServiceSearchProperties" minOccurs="0"/>
               </xsd:all>
             </xsd:complexType>
           </xsd:element>
@@ -12428,7 +12433,21 @@
       </xsd:complexType>
     </xsd:element>
   </xsd:schema>
-  <xsd:schema xmlns:xsd="http://www.w3.org/2001/XMLSchema" xmlns:xs="http://www.w3.org/2001/XMLSchema" xmlns:dms="http://schemas.microsoft.com/office/2006/documentManagement/types" xmlns:pc="http://schemas.microsoft.com/office/infopath/2007/PartnerControls" targetNamespace="25558cfc-09cb-4f21-a339-24113151f02d" elementFormDefault="qualified">
+  <xsd:schema xmlns:xsd="http://www.w3.org/2001/XMLSchema" xmlns:xs="http://www.w3.org/2001/XMLSchema" xmlns:dms="http://schemas.microsoft.com/office/2006/documentManagement/types" xmlns:pc="http://schemas.microsoft.com/office/infopath/2007/PartnerControls" targetNamespace="http://schemas.microsoft.com/sharepoint/v3" elementFormDefault="qualified">
+    <xsd:import namespace="http://schemas.microsoft.com/office/2006/documentManagement/types"/>
+    <xsd:import namespace="http://schemas.microsoft.com/office/infopath/2007/PartnerControls"/>
+    <xsd:element name="_ip_UnifiedCompliancePolicyProperties" ma:index="23" nillable="true" ma:displayName="Unified Compliance Policy Properties" ma:hidden="true" ma:internalName="_ip_UnifiedCompliancePolicyProperties">
+      <xsd:simpleType>
+        <xsd:restriction base="dms:Note"/>
+      </xsd:simpleType>
+    </xsd:element>
+    <xsd:element name="_ip_UnifiedCompliancePolicyUIAction" ma:index="24" nillable="true" ma:displayName="Unified Compliance Policy UI Action" ma:hidden="true" ma:internalName="_ip_UnifiedCompliancePolicyUIAction">
+      <xsd:simpleType>
+        <xsd:restriction base="dms:Text"/>
+      </xsd:simpleType>
+    </xsd:element>
+  </xsd:schema>
+  <xsd:schema xmlns:xsd="http://www.w3.org/2001/XMLSchema" xmlns:xs="http://www.w3.org/2001/XMLSchema" xmlns:dms="http://schemas.microsoft.com/office/2006/documentManagement/types" xmlns:pc="http://schemas.microsoft.com/office/infopath/2007/PartnerControls" targetNamespace="ab1752b4-7f55-4279-8f58-7cb04b745f69" elementFormDefault="qualified">
     <xsd:import namespace="http://schemas.microsoft.com/office/2006/documentManagement/types"/>
     <xsd:import namespace="http://schemas.microsoft.com/office/infopath/2007/PartnerControls"/>
     <xsd:element name="MediaServiceMetadata" ma:index="8" nillable="true" ma:displayName="MediaServiceMetadata" ma:hidden="true" ma:internalName="MediaServiceMetadata" ma:readOnly="true">
@@ -12453,34 +12472,34 @@
         </xsd:restriction>
       </xsd:simpleType>
     </xsd:element>
-    <xsd:element name="MediaServiceAutoTags" ma:index="14" nillable="true" ma:displayName="Tags" ma:internalName="MediaServiceAutoTags" ma:readOnly="true">
+    <xsd:element name="MediaServiceAutoTags" ma:index="12" nillable="true" ma:displayName="Tags" ma:internalName="MediaServiceAutoTags" ma:readOnly="true">
       <xsd:simpleType>
         <xsd:restriction base="dms:Text"/>
       </xsd:simpleType>
     </xsd:element>
-    <xsd:element name="MediaServiceOCR" ma:index="15" nillable="true" ma:displayName="Extracted Text" ma:internalName="MediaServiceOCR" ma:readOnly="true">
+    <xsd:element name="MediaServiceOCR" ma:index="13" nillable="true" ma:displayName="Extracted Text" ma:internalName="MediaServiceOCR" ma:readOnly="true">
       <xsd:simpleType>
         <xsd:restriction base="dms:Note">
           <xsd:maxLength value="255"/>
         </xsd:restriction>
       </xsd:simpleType>
     </xsd:element>
-    <xsd:element name="MediaServiceGenerationTime" ma:index="16" nillable="true" ma:displayName="MediaServiceGenerationTime" ma:hidden="true" ma:internalName="MediaServiceGenerationTime" ma:readOnly="true">
+    <xsd:element name="MediaServiceGenerationTime" ma:index="14" nillable="true" ma:displayName="MediaServiceGenerationTime" ma:hidden="true" ma:internalName="MediaServiceGenerationTime" ma:readOnly="true">
       <xsd:simpleType>
         <xsd:restriction base="dms:Text"/>
       </xsd:simpleType>
     </xsd:element>
-    <xsd:element name="MediaServiceEventHashCode" ma:index="17" nillable="true" ma:displayName="MediaServiceEventHashCode" ma:hidden="true" ma:internalName="MediaServiceEventHashCode" ma:readOnly="true">
+    <xsd:element name="MediaServiceEventHashCode" ma:index="15" nillable="true" ma:displayName="MediaServiceEventHashCode" ma:hidden="true" ma:internalName="MediaServiceEventHashCode" ma:readOnly="true">
       <xsd:simpleType>
         <xsd:restriction base="dms:Text"/>
       </xsd:simpleType>
     </xsd:element>
-    <xsd:element name="MediaServiceDateTaken" ma:index="18" nillable="true" ma:displayName="MediaServiceDateTaken" ma:hidden="true" ma:internalName="MediaServiceDateTaken" ma:readOnly="true">
+    <xsd:element name="MediaServiceDateTaken" ma:index="16" nillable="true" ma:displayName="MediaServiceDateTaken" ma:hidden="true" ma:internalName="MediaServiceDateTaken" ma:readOnly="true">
       <xsd:simpleType>
         <xsd:restriction base="dms:Text"/>
       </xsd:simpleType>
     </xsd:element>
-    <xsd:element name="MediaLengthInSeconds" ma:index="19" nillable="true" ma:displayName="MediaLengthInSeconds" ma:hidden="true" ma:internalName="MediaLengthInSeconds" ma:readOnly="true">
+    <xsd:element name="MediaLengthInSeconds" ma:index="17" nillable="true" ma:displayName="MediaLengthInSeconds" ma:hidden="true" ma:internalName="MediaLengthInSeconds" ma:readOnly="true">
       <xsd:simpleType>
         <xsd:restriction base="dms:Unknown"/>
       </xsd:simpleType>
@@ -12492,11 +12511,21 @@
         </xsd:sequence>
       </xsd:complexType>
     </xsd:element>
+    <xsd:element name="MediaServiceObjectDetectorVersions" ma:index="25" nillable="true" ma:displayName="MediaServiceObjectDetectorVersions" ma:hidden="true" ma:indexed="true" ma:internalName="MediaServiceObjectDetectorVersions" ma:readOnly="true">
+      <xsd:simpleType>
+        <xsd:restriction base="dms:Text"/>
+      </xsd:simpleType>
+    </xsd:element>
+    <xsd:element name="MediaServiceSearchProperties" ma:index="26" nillable="true" ma:displayName="MediaServiceSearchProperties" ma:hidden="true" ma:internalName="MediaServiceSearchProperties" ma:readOnly="true">
+      <xsd:simpleType>
+        <xsd:restriction base="dms:Note"/>
+      </xsd:simpleType>
+    </xsd:element>
   </xsd:schema>
-  <xsd:schema xmlns:xsd="http://www.w3.org/2001/XMLSchema" xmlns:xs="http://www.w3.org/2001/XMLSchema" xmlns:dms="http://schemas.microsoft.com/office/2006/documentManagement/types" xmlns:pc="http://schemas.microsoft.com/office/infopath/2007/PartnerControls" targetNamespace="67e6609d-4da6-43f2-b73c-9b749e56ecda" elementFormDefault="qualified">
+  <xsd:schema xmlns:xsd="http://www.w3.org/2001/XMLSchema" xmlns:xs="http://www.w3.org/2001/XMLSchema" xmlns:dms="http://schemas.microsoft.com/office/2006/documentManagement/types" xmlns:pc="http://schemas.microsoft.com/office/infopath/2007/PartnerControls" targetNamespace="85501699-eeeb-42a5-8a52-bd04b8e60049" elementFormDefault="qualified">
     <xsd:import namespace="http://schemas.microsoft.com/office/2006/documentManagement/types"/>
     <xsd:import namespace="http://schemas.microsoft.com/office/infopath/2007/PartnerControls"/>
-    <xsd:element name="SharedWithUsers" ma:index="12" nillable="true" ma:displayName="Shared With" ma:internalName="SharedWithUsers" ma:readOnly="true">
+    <xsd:element name="SharedWithUsers" ma:index="18" nillable="true" ma:displayName="Shared With" ma:internalName="SharedWithUsers" ma:readOnly="true">
       <xsd:complexType>
         <xsd:complexContent>
           <xsd:extension base="dms:UserMulti">
@@ -12515,14 +12544,14 @@
         </xsd:complexContent>
       </xsd:complexType>
     </xsd:element>
-    <xsd:element name="SharedWithDetails" ma:index="13" nillable="true" ma:displayName="Shared With Details" ma:internalName="SharedWithDetails" ma:readOnly="true">
+    <xsd:element name="SharedWithDetails" ma:index="19" nillable="true" ma:displayName="Shared With Details" ma:internalName="SharedWithDetails" ma:readOnly="true">
       <xsd:simpleType>
         <xsd:restriction base="dms:Note">
           <xsd:maxLength value="255"/>
         </xsd:restriction>
       </xsd:simpleType>
     </xsd:element>
-    <xsd:element name="TaxCatchAll" ma:index="22" nillable="true" ma:displayName="Taxonomy Catch All Column" ma:hidden="true" ma:list="{a6f53592-1060-4e07-aeb7-058c13974b3e}" ma:internalName="TaxCatchAll" ma:showField="CatchAllData" ma:web="67e6609d-4da6-43f2-b73c-9b749e56ecda">
+    <xsd:element name="TaxCatchAll" ma:index="22" nillable="true" ma:displayName="Taxonomy Catch All Column" ma:hidden="true" ma:list="{4f4fd1c5-1e9f-4007-a5a9-81264056e6c1}" ma:internalName="TaxCatchAll" ma:showField="CatchAllData" ma:web="85501699-eeeb-42a5-8a52-bd04b8e60049">
       <xsd:complexType>
         <xsd:complexContent>
           <xsd:extension base="dms:MultiChoiceLookup">
@@ -12636,10 +12665,12 @@
 <file path=customXml/item3.xml><?xml version="1.0" encoding="utf-8"?>
 <p:properties xmlns:p="http://schemas.microsoft.com/office/2006/metadata/properties" xmlns:xsi="http://www.w3.org/2001/XMLSchema-instance" xmlns:pc="http://schemas.microsoft.com/office/infopath/2007/PartnerControls">
   <documentManagement>
-    <lcf76f155ced4ddcb4097134ff3c332f xmlns="25558cfc-09cb-4f21-a339-24113151f02d">
+    <lcf76f155ced4ddcb4097134ff3c332f xmlns="ab1752b4-7f55-4279-8f58-7cb04b745f69">
       <Terms xmlns="http://schemas.microsoft.com/office/infopath/2007/PartnerControls"/>
     </lcf76f155ced4ddcb4097134ff3c332f>
-    <TaxCatchAll xmlns="67e6609d-4da6-43f2-b73c-9b749e56ecda" xsi:nil="true"/>
+    <TaxCatchAll xmlns="85501699-eeeb-42a5-8a52-bd04b8e60049" xsi:nil="true"/>
+    <_ip_UnifiedCompliancePolicyUIAction xmlns="http://schemas.microsoft.com/sharepoint/v3" xsi:nil="true"/>
+    <_ip_UnifiedCompliancePolicyProperties xmlns="http://schemas.microsoft.com/sharepoint/v3" xsi:nil="true"/>
   </documentManagement>
 </p:properties>
 </file>
@@ -12653,7 +12684,7 @@
 </file>
 
 <file path=customXml/itemProps2.xml><?xml version="1.0" encoding="utf-8"?>
-<ds:datastoreItem xmlns:ds="http://schemas.openxmlformats.org/officeDocument/2006/customXml" ds:itemID="{8C0272E7-64E5-46D1-BA9D-607B15B37D08}"/>
+<ds:datastoreItem xmlns:ds="http://schemas.openxmlformats.org/officeDocument/2006/customXml" ds:itemID="{79F3FB23-CA62-4700-B586-70550DF1214E}"/>
 </file>
 
 <file path=customXml/itemProps3.xml><?xml version="1.0" encoding="utf-8"?>

</xml_diff>